<commit_message>
Added user inputs to app
</commit_message>
<xml_diff>
--- a/logos_presentation.pptx
+++ b/logos_presentation.pptx
@@ -3107,7 +3107,7 @@
       </p:sp>
       <p:pic>
         <p:nvPicPr>
-          <p:cNvPr id="3" name="Picture 2" descr="Bank of America.png"/>
+          <p:cNvPr id="3" name="Picture 2" descr="Apple.png"/>
           <p:cNvPicPr>
             <a:picLocks noChangeAspect="1"/>
           </p:cNvPicPr>
@@ -3121,8 +3121,8 @@
         </p:blipFill>
         <p:spPr>
           <a:xfrm>
-            <a:off x="186690" y="881062"/>
-            <a:ext cx="723900" cy="66675"/>
+            <a:off x="477202" y="914400"/>
+            <a:ext cx="371475" cy="457200"/>
           </a:xfrm>
           <a:prstGeom prst="rect">
             <a:avLst/>
@@ -3131,7 +3131,7 @@
       </p:pic>
       <p:pic>
         <p:nvPicPr>
-          <p:cNvPr id="4" name="Picture 3" descr="Goldman Sachs.png"/>
+          <p:cNvPr id="4" name="Picture 3" descr="Bank of America.png"/>
           <p:cNvPicPr>
             <a:picLocks noChangeAspect="1"/>
           </p:cNvPicPr>
@@ -3145,8 +3145,8 @@
         </p:blipFill>
         <p:spPr>
           <a:xfrm>
-            <a:off x="1101090" y="766762"/>
-            <a:ext cx="723900" cy="295275"/>
+            <a:off x="1348740" y="1100137"/>
+            <a:ext cx="914400" cy="85725"/>
           </a:xfrm>
           <a:prstGeom prst="rect">
             <a:avLst/>
@@ -3155,7 +3155,7 @@
       </p:pic>
       <p:pic>
         <p:nvPicPr>
-          <p:cNvPr id="5" name="Picture 4" descr="Morgan Stanley.png"/>
+          <p:cNvPr id="5" name="Picture 4" descr="Facebook.png"/>
           <p:cNvPicPr>
             <a:picLocks noChangeAspect="1"/>
           </p:cNvPicPr>
@@ -3169,8 +3169,8 @@
         </p:blipFill>
         <p:spPr>
           <a:xfrm>
-            <a:off x="2015490" y="866775"/>
-            <a:ext cx="723900" cy="95250"/>
+            <a:off x="2491740" y="1057275"/>
+            <a:ext cx="914400" cy="171450"/>
           </a:xfrm>
           <a:prstGeom prst="rect">
             <a:avLst/>
@@ -3179,7 +3179,7 @@
       </p:pic>
       <p:pic>
         <p:nvPicPr>
-          <p:cNvPr id="6" name="Picture 5" descr="UBS.png"/>
+          <p:cNvPr id="6" name="Picture 5" descr="Goldman Sachs.png"/>
           <p:cNvPicPr>
             <a:picLocks noChangeAspect="1"/>
           </p:cNvPicPr>
@@ -3193,8 +3193,176 @@
         </p:blipFill>
         <p:spPr>
           <a:xfrm>
-            <a:off x="2929890" y="785812"/>
-            <a:ext cx="723900" cy="257175"/>
+            <a:off x="3634740" y="952500"/>
+            <a:ext cx="914400" cy="381000"/>
+          </a:xfrm>
+          <a:prstGeom prst="rect">
+            <a:avLst/>
+          </a:prstGeom>
+        </p:spPr>
+      </p:pic>
+      <p:pic>
+        <p:nvPicPr>
+          <p:cNvPr id="7" name="Picture 6" descr="Google.png"/>
+          <p:cNvPicPr>
+            <a:picLocks noChangeAspect="1"/>
+          </p:cNvPicPr>
+          <p:nvPr/>
+        </p:nvPicPr>
+        <p:blipFill>
+          <a:blip r:embed="rId6"/>
+          <a:stretch>
+            <a:fillRect/>
+          </a:stretch>
+        </p:blipFill>
+        <p:spPr>
+          <a:xfrm>
+            <a:off x="4777740" y="1000125"/>
+            <a:ext cx="914400" cy="285750"/>
+          </a:xfrm>
+          <a:prstGeom prst="rect">
+            <a:avLst/>
+          </a:prstGeom>
+        </p:spPr>
+      </p:pic>
+      <p:pic>
+        <p:nvPicPr>
+          <p:cNvPr id="8" name="Picture 7" descr="JPMorgan.png"/>
+          <p:cNvPicPr>
+            <a:picLocks noChangeAspect="1"/>
+          </p:cNvPicPr>
+          <p:nvPr/>
+        </p:nvPicPr>
+        <p:blipFill>
+          <a:blip r:embed="rId7"/>
+          <a:stretch>
+            <a:fillRect/>
+          </a:stretch>
+        </p:blipFill>
+        <p:spPr>
+          <a:xfrm>
+            <a:off x="205740" y="2195512"/>
+            <a:ext cx="914400" cy="180975"/>
+          </a:xfrm>
+          <a:prstGeom prst="rect">
+            <a:avLst/>
+          </a:prstGeom>
+        </p:spPr>
+      </p:pic>
+      <p:pic>
+        <p:nvPicPr>
+          <p:cNvPr id="9" name="Picture 8" descr="KFC.png"/>
+          <p:cNvPicPr>
+            <a:picLocks noChangeAspect="1"/>
+          </p:cNvPicPr>
+          <p:nvPr/>
+        </p:nvPicPr>
+        <p:blipFill>
+          <a:blip r:embed="rId8"/>
+          <a:stretch>
+            <a:fillRect/>
+          </a:stretch>
+        </p:blipFill>
+        <p:spPr>
+          <a:xfrm>
+            <a:off x="1348740" y="2152650"/>
+            <a:ext cx="914400" cy="266700"/>
+          </a:xfrm>
+          <a:prstGeom prst="rect">
+            <a:avLst/>
+          </a:prstGeom>
+        </p:spPr>
+      </p:pic>
+      <p:pic>
+        <p:nvPicPr>
+          <p:cNvPr id="10" name="Picture 9" descr="Meta.png"/>
+          <p:cNvPicPr>
+            <a:picLocks noChangeAspect="1"/>
+          </p:cNvPicPr>
+          <p:nvPr/>
+        </p:nvPicPr>
+        <p:blipFill>
+          <a:blip r:embed="rId9"/>
+          <a:stretch>
+            <a:fillRect/>
+          </a:stretch>
+        </p:blipFill>
+        <p:spPr>
+          <a:xfrm>
+            <a:off x="2491740" y="2190750"/>
+            <a:ext cx="914400" cy="190500"/>
+          </a:xfrm>
+          <a:prstGeom prst="rect">
+            <a:avLst/>
+          </a:prstGeom>
+        </p:spPr>
+      </p:pic>
+      <p:pic>
+        <p:nvPicPr>
+          <p:cNvPr id="11" name="Picture 10" descr="Morgan Stanley.png"/>
+          <p:cNvPicPr>
+            <a:picLocks noChangeAspect="1"/>
+          </p:cNvPicPr>
+          <p:nvPr/>
+        </p:nvPicPr>
+        <p:blipFill>
+          <a:blip r:embed="rId10"/>
+          <a:stretch>
+            <a:fillRect/>
+          </a:stretch>
+        </p:blipFill>
+        <p:spPr>
+          <a:xfrm>
+            <a:off x="3634740" y="2224088"/>
+            <a:ext cx="914400" cy="123824"/>
+          </a:xfrm>
+          <a:prstGeom prst="rect">
+            <a:avLst/>
+          </a:prstGeom>
+        </p:spPr>
+      </p:pic>
+      <p:pic>
+        <p:nvPicPr>
+          <p:cNvPr id="12" name="Picture 11" descr="Tesla.png"/>
+          <p:cNvPicPr>
+            <a:picLocks noChangeAspect="1"/>
+          </p:cNvPicPr>
+          <p:nvPr/>
+        </p:nvPicPr>
+        <p:blipFill>
+          <a:blip r:embed="rId11"/>
+          <a:stretch>
+            <a:fillRect/>
+          </a:stretch>
+        </p:blipFill>
+        <p:spPr>
+          <a:xfrm>
+            <a:off x="4777740" y="2243137"/>
+            <a:ext cx="914400" cy="85725"/>
+          </a:xfrm>
+          <a:prstGeom prst="rect">
+            <a:avLst/>
+          </a:prstGeom>
+        </p:spPr>
+      </p:pic>
+      <p:pic>
+        <p:nvPicPr>
+          <p:cNvPr id="13" name="Picture 12" descr="UBS.png"/>
+          <p:cNvPicPr>
+            <a:picLocks noChangeAspect="1"/>
+          </p:cNvPicPr>
+          <p:nvPr/>
+        </p:nvPicPr>
+        <p:blipFill>
+          <a:blip r:embed="rId12"/>
+          <a:stretch>
+            <a:fillRect/>
+          </a:stretch>
+        </p:blipFill>
+        <p:spPr>
+          <a:xfrm>
+            <a:off x="205740" y="3267075"/>
+            <a:ext cx="914400" cy="323850"/>
           </a:xfrm>
           <a:prstGeom prst="rect">
             <a:avLst/>

</xml_diff>

<commit_message>
Made UI more attractive
</commit_message>
<xml_diff>
--- a/logos_presentation.pptx
+++ b/logos_presentation.pptx
@@ -3131,7 +3131,7 @@
       </p:pic>
       <p:pic>
         <p:nvPicPr>
-          <p:cNvPr id="4" name="Picture 3" descr="Google.png"/>
+          <p:cNvPr id="4" name="Picture 3" descr="Facebook.png"/>
           <p:cNvPicPr>
             <a:picLocks noChangeAspect="1"/>
           </p:cNvPicPr>
@@ -3145,8 +3145,8 @@
         </p:blipFill>
         <p:spPr>
           <a:xfrm>
-            <a:off x="1348740" y="1000125"/>
-            <a:ext cx="914400" cy="285750"/>
+            <a:off x="1348740" y="1057275"/>
+            <a:ext cx="914400" cy="171450"/>
           </a:xfrm>
           <a:prstGeom prst="rect">
             <a:avLst/>
@@ -3155,7 +3155,7 @@
       </p:pic>
       <p:pic>
         <p:nvPicPr>
-          <p:cNvPr id="5" name="Picture 4" descr="Meta.png"/>
+          <p:cNvPr id="5" name="Picture 4" descr="Google.png"/>
           <p:cNvPicPr>
             <a:picLocks noChangeAspect="1"/>
           </p:cNvPicPr>
@@ -3169,8 +3169,8 @@
         </p:blipFill>
         <p:spPr>
           <a:xfrm>
-            <a:off x="2491740" y="1047750"/>
-            <a:ext cx="914400" cy="190500"/>
+            <a:off x="2491740" y="1000125"/>
+            <a:ext cx="914400" cy="285750"/>
           </a:xfrm>
           <a:prstGeom prst="rect">
             <a:avLst/>

</xml_diff>